<commit_message>
Added PPT for Tech Shuttle Introduction
</commit_message>
<xml_diff>
--- a/slides/Tech shuttle Introduction.pptx
+++ b/slides/Tech shuttle Introduction.pptx
@@ -7,7 +7,7 @@
   <p:sldIdLst>
     <p:sldId id="257" r:id="rId5"/>
     <p:sldId id="262" r:id="rId6"/>
-    <p:sldId id="263" r:id="rId7"/>
+    <p:sldId id="265" r:id="rId7"/>
     <p:sldId id="264" r:id="rId8"/>
   </p:sldIdLst>
   <p:sldSz cx="12192000" cy="6858000"/>
@@ -3811,7 +3811,7 @@
           <a:p>
             <a:fld id="{EA0C0817-A112-4847-8014-A94B7D2A4EA3}" type="datetime1">
               <a:rPr lang="en-US" smtClean="0"/>
-              <a:t>5/9/2020</a:t>
+              <a:t>5/10/2020</a:t>
             </a:fld>
             <a:endParaRPr lang="en-US" dirty="0"/>
           </a:p>
@@ -4013,7 +4013,7 @@
           <a:p>
             <a:fld id="{7332B432-ACDA-4023-A761-2BAB76577B62}" type="datetime1">
               <a:rPr lang="en-US" smtClean="0"/>
-              <a:t>5/9/2020</a:t>
+              <a:t>5/10/2020</a:t>
             </a:fld>
             <a:endParaRPr lang="en-US" dirty="0"/>
           </a:p>
@@ -4612,7 +4612,7 @@
           <a:p>
             <a:fld id="{D9C646AA-F36E-4540-911D-FFFC0A0EF24A}" type="datetime1">
               <a:rPr lang="en-US" smtClean="0"/>
-              <a:t>5/9/2020</a:t>
+              <a:t>5/10/2020</a:t>
             </a:fld>
             <a:endParaRPr lang="en-US" dirty="0"/>
           </a:p>
@@ -4932,7 +4932,7 @@
           <a:p>
             <a:fld id="{69186D26-FA5F-4637-B602-B7C2DC34CFD4}" type="datetime1">
               <a:rPr lang="en-US" smtClean="0"/>
-              <a:t>5/9/2020</a:t>
+              <a:t>5/10/2020</a:t>
             </a:fld>
             <a:endParaRPr lang="en-US" dirty="0"/>
           </a:p>
@@ -5369,7 +5369,7 @@
           <a:p>
             <a:fld id="{8A7F15D8-96D1-4781-BC50-CA8A088B2FE4}" type="datetime1">
               <a:rPr lang="en-US" smtClean="0"/>
-              <a:t>5/9/2020</a:t>
+              <a:t>5/10/2020</a:t>
             </a:fld>
             <a:endParaRPr lang="en-US" dirty="0"/>
           </a:p>
@@ -5487,7 +5487,7 @@
           <a:p>
             <a:fld id="{F9A96C99-B8F8-4528-BD05-0E16E943DC09}" type="datetime1">
               <a:rPr lang="en-US" smtClean="0"/>
-              <a:t>5/9/2020</a:t>
+              <a:t>5/10/2020</a:t>
             </a:fld>
             <a:endParaRPr lang="en-US" dirty="0"/>
           </a:p>
@@ -5582,7 +5582,7 @@
           <a:p>
             <a:fld id="{03636942-C211-4B28-8DBD-C953E00AF71B}" type="datetime1">
               <a:rPr lang="en-US" smtClean="0"/>
-              <a:t>5/9/2020</a:t>
+              <a:t>5/10/2020</a:t>
             </a:fld>
             <a:endParaRPr lang="en-US" dirty="0"/>
           </a:p>
@@ -5999,7 +5999,7 @@
           <a:p>
             <a:fld id="{7E8D12A6-918A-48BD-8CB9-CA713993B0EA}" type="datetime1">
               <a:rPr lang="en-US" smtClean="0"/>
-              <a:t>5/9/2020</a:t>
+              <a:t>5/10/2020</a:t>
             </a:fld>
             <a:endParaRPr lang="en-US" dirty="0"/>
           </a:p>
@@ -6261,7 +6261,7 @@
             <a:fld id="{E778CE86-875F-4587-BCF6-FA054AFC0D53}" type="datetime1">
               <a:rPr lang="en-US" smtClean="0"/>
               <a:pPr/>
-              <a:t>5/9/2020</a:t>
+              <a:t>5/10/2020</a:t>
             </a:fld>
             <a:endParaRPr lang="en-US" dirty="0"/>
           </a:p>
@@ -6777,7 +6777,7 @@
           <a:p>
             <a:fld id="{F6FA2B21-3FCD-4721-B95C-427943F61125}" type="datetime1">
               <a:rPr lang="en-US" smtClean="0"/>
-              <a:t>5/9/2020</a:t>
+              <a:t>5/10/2020</a:t>
             </a:fld>
             <a:endParaRPr lang="en-US" dirty="0"/>
           </a:p>
@@ -7588,10 +7588,10 @@
       </p:grpSpPr>
       <p:sp>
         <p:nvSpPr>
-          <p:cNvPr id="10" name="Title 1">
+          <p:cNvPr id="2" name="Title 1">
             <a:extLst>
               <a:ext uri="{FF2B5EF4-FFF2-40B4-BE49-F238E27FC236}">
-                <a16:creationId xmlns:a16="http://schemas.microsoft.com/office/drawing/2014/main" id="{E7E61857-081F-4968-8EC9-173BAE2B33C4}"/>
+                <a16:creationId xmlns:a16="http://schemas.microsoft.com/office/drawing/2014/main" id="{39494FD8-FD8F-4087-B9A4-833200FE8D06}"/>
               </a:ext>
             </a:extLst>
           </p:cNvPr>
@@ -7602,26 +7602,21 @@
             <p:ph type="title"/>
           </p:nvPr>
         </p:nvSpPr>
-        <p:spPr>
-          <a:xfrm>
-            <a:off x="1066800" y="642594"/>
-            <a:ext cx="10058400" cy="1371600"/>
-          </a:xfrm>
-        </p:spPr>
+        <p:spPr/>
         <p:txBody>
           <a:bodyPr/>
           <a:lstStyle/>
           <a:p>
-            <a:endParaRPr lang="en-US" dirty="0"/>
+            <a:endParaRPr lang="en-IN"/>
           </a:p>
         </p:txBody>
       </p:sp>
       <p:pic>
         <p:nvPicPr>
-          <p:cNvPr id="5" name="Content Placeholder 4" descr="A picture containing food&#10;&#10;Description automatically generated">
+          <p:cNvPr id="5" name="Content Placeholder 4" descr="A picture containing table, sitting, white, computer&#10;&#10;Description automatically generated">
             <a:extLst>
               <a:ext uri="{FF2B5EF4-FFF2-40B4-BE49-F238E27FC236}">
-                <a16:creationId xmlns:a16="http://schemas.microsoft.com/office/drawing/2014/main" id="{0D4A6171-23B9-4F5B-B88E-55EA5EB575CF}"/>
+                <a16:creationId xmlns:a16="http://schemas.microsoft.com/office/drawing/2014/main" id="{EED95FCE-62B1-48FA-9D21-F8DD8AD35867}"/>
               </a:ext>
             </a:extLst>
           </p:cNvPr>
@@ -7640,16 +7635,105 @@
         </p:blipFill>
         <p:spPr>
           <a:xfrm>
-            <a:off x="1066800" y="2770632"/>
-            <a:ext cx="10058400" cy="2514600"/>
+            <a:off x="1327007" y="373536"/>
+            <a:ext cx="4768993" cy="2862482"/>
           </a:xfrm>
-          <a:noFill/>
+        </p:spPr>
+      </p:pic>
+      <p:pic>
+        <p:nvPicPr>
+          <p:cNvPr id="7" name="Picture 6" descr="A close up of text on a black background&#10;&#10;Description automatically generated">
+            <a:extLst>
+              <a:ext uri="{FF2B5EF4-FFF2-40B4-BE49-F238E27FC236}">
+                <a16:creationId xmlns:a16="http://schemas.microsoft.com/office/drawing/2014/main" id="{29D89A49-17E0-4F10-87F8-C312B10F11F2}"/>
+              </a:ext>
+            </a:extLst>
+          </p:cNvPr>
+          <p:cNvPicPr>
+            <a:picLocks noChangeAspect="1"/>
+          </p:cNvPicPr>
+          <p:nvPr/>
+        </p:nvPicPr>
+        <p:blipFill>
+          <a:blip r:embed="rId3"/>
+          <a:stretch>
+            <a:fillRect/>
+          </a:stretch>
+        </p:blipFill>
+        <p:spPr>
+          <a:xfrm>
+            <a:off x="1345562" y="3321974"/>
+            <a:ext cx="4750437" cy="3107577"/>
+          </a:xfrm>
+          <a:prstGeom prst="rect">
+            <a:avLst/>
+          </a:prstGeom>
+        </p:spPr>
+      </p:pic>
+      <p:pic>
+        <p:nvPicPr>
+          <p:cNvPr id="9" name="Picture 8">
+            <a:extLst>
+              <a:ext uri="{FF2B5EF4-FFF2-40B4-BE49-F238E27FC236}">
+                <a16:creationId xmlns:a16="http://schemas.microsoft.com/office/drawing/2014/main" id="{2A9A3CF7-3A54-4010-B7BF-258AB3B968E1}"/>
+              </a:ext>
+            </a:extLst>
+          </p:cNvPr>
+          <p:cNvPicPr>
+            <a:picLocks noChangeAspect="1"/>
+          </p:cNvPicPr>
+          <p:nvPr/>
+        </p:nvPicPr>
+        <p:blipFill>
+          <a:blip r:embed="rId4"/>
+          <a:stretch>
+            <a:fillRect/>
+          </a:stretch>
+        </p:blipFill>
+        <p:spPr>
+          <a:xfrm>
+            <a:off x="6096000" y="389970"/>
+            <a:ext cx="5172889" cy="2965790"/>
+          </a:xfrm>
+          <a:prstGeom prst="rect">
+            <a:avLst/>
+          </a:prstGeom>
+        </p:spPr>
+      </p:pic>
+      <p:pic>
+        <p:nvPicPr>
+          <p:cNvPr id="11" name="Picture 10" descr="A picture containing drawing&#10;&#10;Description automatically generated">
+            <a:extLst>
+              <a:ext uri="{FF2B5EF4-FFF2-40B4-BE49-F238E27FC236}">
+                <a16:creationId xmlns:a16="http://schemas.microsoft.com/office/drawing/2014/main" id="{FDF94856-A2E4-4DE1-89C7-7B2E6F80D478}"/>
+              </a:ext>
+            </a:extLst>
+          </p:cNvPr>
+          <p:cNvPicPr>
+            <a:picLocks noChangeAspect="1"/>
+          </p:cNvPicPr>
+          <p:nvPr/>
+        </p:nvPicPr>
+        <p:blipFill>
+          <a:blip r:embed="rId5"/>
+          <a:stretch>
+            <a:fillRect/>
+          </a:stretch>
+        </p:blipFill>
+        <p:spPr>
+          <a:xfrm>
+            <a:off x="6096000" y="3372194"/>
+            <a:ext cx="5172889" cy="2923806"/>
+          </a:xfrm>
+          <a:prstGeom prst="rect">
+            <a:avLst/>
+          </a:prstGeom>
         </p:spPr>
       </p:pic>
     </p:spTree>
     <p:extLst>
       <p:ext uri="{BB962C8B-B14F-4D97-AF65-F5344CB8AC3E}">
-        <p14:creationId xmlns:p14="http://schemas.microsoft.com/office/powerpoint/2010/main" val="2677960193"/>
+        <p14:creationId xmlns:p14="http://schemas.microsoft.com/office/powerpoint/2010/main" val="327553185"/>
       </p:ext>
     </p:extLst>
   </p:cSld>
@@ -7737,8 +7821,28 @@
               <a:rPr lang="en-IN" dirty="0">
                 <a:hlinkClick r:id="rId2"/>
               </a:rPr>
-              <a:t>https://github.com/techshuttle</a:t>
+              <a:t>https://github.com/techshuttle/walkietalkie</a:t>
             </a:r>
+            <a:endParaRPr lang="en-IN" dirty="0"/>
+          </a:p>
+          <a:p>
+            <a:r>
+              <a:rPr lang="en-IN" dirty="0" err="1"/>
+              <a:t>Linkedin</a:t>
+            </a:r>
+            <a:r>
+              <a:rPr lang="en-IN" dirty="0"/>
+              <a:t> Group: </a:t>
+            </a:r>
+            <a:r>
+              <a:rPr lang="en-IN" dirty="0">
+                <a:hlinkClick r:id="rId3"/>
+              </a:rPr>
+              <a:t>https://www.linkedin.com/groups/8927935/</a:t>
+            </a:r>
+            <a:endParaRPr lang="en-IN" dirty="0"/>
+          </a:p>
+          <a:p>
             <a:endParaRPr lang="en-IN" dirty="0"/>
           </a:p>
           <a:p>
@@ -8036,24 +8140,6 @@
 </file>
 
 <file path=customXml/item1.xml><?xml version="1.0" encoding="utf-8"?>
-<p:properties xmlns:p="http://schemas.microsoft.com/office/2006/metadata/properties" xmlns:xsi="http://www.w3.org/2001/XMLSchema-instance" xmlns:pc="http://schemas.microsoft.com/office/infopath/2007/PartnerControls">
-  <documentManagement>
-    <Status xmlns="71af3243-3dd4-4a8d-8c0d-dd76da1f02a5">Not started</Status>
-    <MediaServiceKeyPoints xmlns="71af3243-3dd4-4a8d-8c0d-dd76da1f02a5" xsi:nil="true"/>
-  </documentManagement>
-</p:properties>
-</file>
-
-<file path=customXml/item2.xml><?xml version="1.0" encoding="utf-8"?>
-<?mso-contentType ?>
-<FormTemplates xmlns="http://schemas.microsoft.com/sharepoint/v3/contenttype/forms">
-  <Display>DocumentLibraryForm</Display>
-  <Edit>DocumentLibraryForm</Edit>
-  <New>DocumentLibraryForm</New>
-</FormTemplates>
-</file>
-
-<file path=customXml/item3.xml><?xml version="1.0" encoding="utf-8"?>
 <ct:contentTypeSchema xmlns:ct="http://schemas.microsoft.com/office/2006/metadata/contentType" xmlns:ma="http://schemas.microsoft.com/office/2006/metadata/properties/metaAttributes" ct:_="" ma:_="" ma:contentTypeName="Document" ma:contentTypeID="0x01010079F111ED35F8CC479449609E8A0923A6" ma:contentTypeVersion="12" ma:contentTypeDescription="Create a new document." ma:contentTypeScope="" ma:versionID="a410dd7f93c95333ffa1b60ed6adedd1">
   <xsd:schema xmlns:xsd="http://www.w3.org/2001/XMLSchema" xmlns:xs="http://www.w3.org/2001/XMLSchema" xmlns:p="http://schemas.microsoft.com/office/2006/metadata/properties" xmlns:ns2="71af3243-3dd4-4a8d-8c0d-dd76da1f02a5" xmlns:ns3="16c05727-aa75-4e4a-9b5f-8a80a1165891" targetNamespace="http://schemas.microsoft.com/office/2006/metadata/properties" ma:root="true" ma:fieldsID="a936d9baba76aa3866493feff160faab" ns2:_="" ns3:_="">
     <xsd:import namespace="71af3243-3dd4-4a8d-8c0d-dd76da1f02a5"/>
@@ -8274,25 +8360,25 @@
 </ct:contentTypeSchema>
 </file>
 
-<file path=customXml/itemProps1.xml><?xml version="1.0" encoding="utf-8"?>
-<ds:datastoreItem xmlns:ds="http://schemas.openxmlformats.org/officeDocument/2006/customXml" ds:itemID="{137651BA-F45C-4845-9AB3-E0A65B39F5E1}">
-  <ds:schemaRefs>
-    <ds:schemaRef ds:uri="http://schemas.microsoft.com/office/2006/metadata/properties"/>
-    <ds:schemaRef ds:uri="http://schemas.microsoft.com/office/infopath/2007/PartnerControls"/>
-    <ds:schemaRef ds:uri="71af3243-3dd4-4a8d-8c0d-dd76da1f02a5"/>
-  </ds:schemaRefs>
-</ds:datastoreItem>
+<file path=customXml/item2.xml><?xml version="1.0" encoding="utf-8"?>
+<?mso-contentType ?>
+<FormTemplates xmlns="http://schemas.microsoft.com/sharepoint/v3/contenttype/forms">
+  <Display>DocumentLibraryForm</Display>
+  <Edit>DocumentLibraryForm</Edit>
+  <New>DocumentLibraryForm</New>
+</FormTemplates>
 </file>
 
-<file path=customXml/itemProps2.xml><?xml version="1.0" encoding="utf-8"?>
-<ds:datastoreItem xmlns:ds="http://schemas.openxmlformats.org/officeDocument/2006/customXml" ds:itemID="{CDB58277-F8DF-46FF-84EC-EF41B835E69F}">
-  <ds:schemaRefs>
-    <ds:schemaRef ds:uri="http://schemas.microsoft.com/sharepoint/v3/contenttype/forms"/>
-  </ds:schemaRefs>
-</ds:datastoreItem>
+<file path=customXml/item3.xml><?xml version="1.0" encoding="utf-8"?>
+<p:properties xmlns:p="http://schemas.microsoft.com/office/2006/metadata/properties" xmlns:xsi="http://www.w3.org/2001/XMLSchema-instance" xmlns:pc="http://schemas.microsoft.com/office/infopath/2007/PartnerControls">
+  <documentManagement>
+    <Status xmlns="71af3243-3dd4-4a8d-8c0d-dd76da1f02a5">Not started</Status>
+    <MediaServiceKeyPoints xmlns="71af3243-3dd4-4a8d-8c0d-dd76da1f02a5" xsi:nil="true"/>
+  </documentManagement>
+</p:properties>
 </file>
 
-<file path=customXml/itemProps3.xml><?xml version="1.0" encoding="utf-8"?>
+<file path=customXml/itemProps1.xml><?xml version="1.0" encoding="utf-8"?>
 <ds:datastoreItem xmlns:ds="http://schemas.openxmlformats.org/officeDocument/2006/customXml" ds:itemID="{2D276E62-80A3-44DD-9BCC-97ED2B99B57F}">
   <ds:schemaRefs>
     <ds:schemaRef ds:uri="http://schemas.microsoft.com/office/2006/metadata/contentType"/>
@@ -8309,4 +8395,22 @@
     <ds:schemaRef ds:uri="http://schemas.microsoft.com/internal/obd"/>
   </ds:schemaRefs>
 </ds:datastoreItem>
+</file>
+
+<file path=customXml/itemProps2.xml><?xml version="1.0" encoding="utf-8"?>
+<ds:datastoreItem xmlns:ds="http://schemas.openxmlformats.org/officeDocument/2006/customXml" ds:itemID="{CDB58277-F8DF-46FF-84EC-EF41B835E69F}">
+  <ds:schemaRefs>
+    <ds:schemaRef ds:uri="http://schemas.microsoft.com/sharepoint/v3/contenttype/forms"/>
+  </ds:schemaRefs>
+</ds:datastoreItem>
+</file>
+
+<file path=customXml/itemProps3.xml><?xml version="1.0" encoding="utf-8"?>
+<ds:datastoreItem xmlns:ds="http://schemas.openxmlformats.org/officeDocument/2006/customXml" ds:itemID="{137651BA-F45C-4845-9AB3-E0A65B39F5E1}">
+  <ds:schemaRefs>
+    <ds:schemaRef ds:uri="http://schemas.microsoft.com/office/2006/metadata/properties"/>
+    <ds:schemaRef ds:uri="http://schemas.microsoft.com/office/infopath/2007/PartnerControls"/>
+    <ds:schemaRef ds:uri="71af3243-3dd4-4a8d-8c0d-dd76da1f02a5"/>
+  </ds:schemaRefs>
+</ds:datastoreItem>
 </file>
</xml_diff>